<commit_message>
Remove deadzone in old manual
</commit_message>
<xml_diff>
--- a/Gen1Archive/doc/Firmware_manual.pptx
+++ b/Gen1Archive/doc/Firmware_manual.pptx
@@ -5,6 +5,12 @@
     <p:sldMasterId id="2147483650" r:id="rId1"/>
     <p:sldMasterId id="2147483648" r:id="rId2"/>
   </p:sldMasterIdLst>
+  <p:notesMasterIdLst>
+    <p:notesMasterId r:id="rId8"/>
+  </p:notesMasterIdLst>
+  <p:handoutMasterIdLst>
+    <p:handoutMasterId r:id="rId9"/>
+  </p:handoutMasterIdLst>
   <p:sldIdLst>
     <p:sldId id="256" r:id="rId3"/>
     <p:sldId id="258" r:id="rId4"/>
@@ -13,7 +19,7 @@
     <p:sldId id="260" r:id="rId7"/>
   </p:sldIdLst>
   <p:sldSz cx="12192000" cy="6858000"/>
-  <p:notesSz cx="6858000" cy="9144000"/>
+  <p:notesSz cx="10234613" cy="7104063"/>
   <p:defaultTextStyle>
     <a:defPPr>
       <a:defRPr lang="zh-CN"/>
@@ -117,6 +123,546 @@
 </p:presentation>
 </file>
 
+<file path=ppt/handoutMasters/handoutMaster1.xml><?xml version="1.0" encoding="utf-8"?>
+<p:handoutMaster xmlns:a="http://schemas.openxmlformats.org/drawingml/2006/main" xmlns:r="http://schemas.openxmlformats.org/officeDocument/2006/relationships" xmlns:p="http://schemas.openxmlformats.org/presentationml/2006/main">
+  <p:cSld>
+    <p:bg>
+      <p:bgRef idx="1001">
+        <a:schemeClr val="bg1"/>
+      </p:bgRef>
+    </p:bg>
+    <p:spTree>
+      <p:nvGrpSpPr>
+        <p:cNvPr id="1" name=""/>
+        <p:cNvGrpSpPr/>
+        <p:nvPr/>
+      </p:nvGrpSpPr>
+      <p:grpSpPr>
+        <a:xfrm>
+          <a:off x="0" y="0"/>
+          <a:ext cx="0" cy="0"/>
+          <a:chOff x="0" y="0"/>
+          <a:chExt cx="0" cy="0"/>
+        </a:xfrm>
+      </p:grpSpPr>
+      <p:sp>
+        <p:nvSpPr>
+          <p:cNvPr id="2" name="页眉占位符 1">
+            <a:extLst>
+              <a:ext uri="{FF2B5EF4-FFF2-40B4-BE49-F238E27FC236}">
+                <a16:creationId xmlns:a16="http://schemas.microsoft.com/office/drawing/2014/main" id="{71764764-F7B7-4619-934D-9CC2DA7D773D}"/>
+              </a:ext>
+            </a:extLst>
+          </p:cNvPr>
+          <p:cNvSpPr>
+            <a:spLocks noGrp="1"/>
+          </p:cNvSpPr>
+          <p:nvPr>
+            <p:ph type="hdr" sz="quarter"/>
+          </p:nvPr>
+        </p:nvSpPr>
+        <p:spPr>
+          <a:xfrm>
+            <a:off x="1" y="0"/>
+            <a:ext cx="4434999" cy="356848"/>
+          </a:xfrm>
+          <a:prstGeom prst="rect">
+            <a:avLst/>
+          </a:prstGeom>
+        </p:spPr>
+        <p:txBody>
+          <a:bodyPr vert="horz" lIns="96645" tIns="48323" rIns="96645" bIns="48323" rtlCol="0"/>
+          <a:lstStyle>
+            <a:lvl1pPr algn="l">
+              <a:defRPr sz="1300"/>
+            </a:lvl1pPr>
+          </a:lstStyle>
+          <a:p>
+            <a:endParaRPr lang="zh-CN" altLang="en-US"/>
+          </a:p>
+        </p:txBody>
+      </p:sp>
+      <p:sp>
+        <p:nvSpPr>
+          <p:cNvPr id="3" name="日期占位符 2">
+            <a:extLst>
+              <a:ext uri="{FF2B5EF4-FFF2-40B4-BE49-F238E27FC236}">
+                <a16:creationId xmlns:a16="http://schemas.microsoft.com/office/drawing/2014/main" id="{858A1338-F101-5E10-CC5D-2790077B64DE}"/>
+              </a:ext>
+            </a:extLst>
+          </p:cNvPr>
+          <p:cNvSpPr>
+            <a:spLocks noGrp="1"/>
+          </p:cNvSpPr>
+          <p:nvPr>
+            <p:ph type="dt" sz="quarter" idx="1"/>
+          </p:nvPr>
+        </p:nvSpPr>
+        <p:spPr>
+          <a:xfrm>
+            <a:off x="5797838" y="0"/>
+            <a:ext cx="4434999" cy="356848"/>
+          </a:xfrm>
+          <a:prstGeom prst="rect">
+            <a:avLst/>
+          </a:prstGeom>
+        </p:spPr>
+        <p:txBody>
+          <a:bodyPr vert="horz" lIns="96645" tIns="48323" rIns="96645" bIns="48323" rtlCol="0"/>
+          <a:lstStyle>
+            <a:lvl1pPr algn="r">
+              <a:defRPr sz="1300"/>
+            </a:lvl1pPr>
+          </a:lstStyle>
+          <a:p>
+            <a:fld id="{99D69C7F-8110-406B-A63E-81EB2EBDFE06}" type="datetimeFigureOut">
+              <a:rPr lang="zh-CN" altLang="en-US" smtClean="0"/>
+              <a:t>2024/12/18</a:t>
+            </a:fld>
+            <a:endParaRPr lang="zh-CN" altLang="en-US"/>
+          </a:p>
+        </p:txBody>
+      </p:sp>
+      <p:sp>
+        <p:nvSpPr>
+          <p:cNvPr id="4" name="页脚占位符 3">
+            <a:extLst>
+              <a:ext uri="{FF2B5EF4-FFF2-40B4-BE49-F238E27FC236}">
+                <a16:creationId xmlns:a16="http://schemas.microsoft.com/office/drawing/2014/main" id="{507E4FB9-0392-C2B7-584F-62331B974F21}"/>
+              </a:ext>
+            </a:extLst>
+          </p:cNvPr>
+          <p:cNvSpPr>
+            <a:spLocks noGrp="1"/>
+          </p:cNvSpPr>
+          <p:nvPr>
+            <p:ph type="ftr" sz="quarter" idx="2"/>
+          </p:nvPr>
+        </p:nvSpPr>
+        <p:spPr>
+          <a:xfrm>
+            <a:off x="1" y="6747217"/>
+            <a:ext cx="4434999" cy="356847"/>
+          </a:xfrm>
+          <a:prstGeom prst="rect">
+            <a:avLst/>
+          </a:prstGeom>
+        </p:spPr>
+        <p:txBody>
+          <a:bodyPr vert="horz" lIns="96645" tIns="48323" rIns="96645" bIns="48323" rtlCol="0" anchor="b"/>
+          <a:lstStyle>
+            <a:lvl1pPr algn="l">
+              <a:defRPr sz="1300"/>
+            </a:lvl1pPr>
+          </a:lstStyle>
+          <a:p>
+            <a:endParaRPr lang="zh-CN" altLang="en-US"/>
+          </a:p>
+        </p:txBody>
+      </p:sp>
+      <p:sp>
+        <p:nvSpPr>
+          <p:cNvPr id="5" name="灯片编号占位符 4">
+            <a:extLst>
+              <a:ext uri="{FF2B5EF4-FFF2-40B4-BE49-F238E27FC236}">
+                <a16:creationId xmlns:a16="http://schemas.microsoft.com/office/drawing/2014/main" id="{AD524316-12F8-295D-718D-5D2EB1C9AE7E}"/>
+              </a:ext>
+            </a:extLst>
+          </p:cNvPr>
+          <p:cNvSpPr>
+            <a:spLocks noGrp="1"/>
+          </p:cNvSpPr>
+          <p:nvPr>
+            <p:ph type="sldNum" sz="quarter" idx="3"/>
+          </p:nvPr>
+        </p:nvSpPr>
+        <p:spPr>
+          <a:xfrm>
+            <a:off x="5797838" y="6747217"/>
+            <a:ext cx="4434999" cy="356847"/>
+          </a:xfrm>
+          <a:prstGeom prst="rect">
+            <a:avLst/>
+          </a:prstGeom>
+        </p:spPr>
+        <p:txBody>
+          <a:bodyPr vert="horz" lIns="96645" tIns="48323" rIns="96645" bIns="48323" rtlCol="0" anchor="b"/>
+          <a:lstStyle>
+            <a:lvl1pPr algn="r">
+              <a:defRPr sz="1300"/>
+            </a:lvl1pPr>
+          </a:lstStyle>
+          <a:p>
+            <a:fld id="{F545FEA8-D3DB-4D9A-BCE9-EEC10C5A982C}" type="slidenum">
+              <a:rPr lang="zh-CN" altLang="en-US" smtClean="0"/>
+              <a:t>‹#›</a:t>
+            </a:fld>
+            <a:endParaRPr lang="zh-CN" altLang="en-US"/>
+          </a:p>
+        </p:txBody>
+      </p:sp>
+    </p:spTree>
+    <p:extLst>
+      <p:ext uri="{BB962C8B-B14F-4D97-AF65-F5344CB8AC3E}">
+        <p14:creationId xmlns:p14="http://schemas.microsoft.com/office/powerpoint/2010/main" val="3943416882"/>
+      </p:ext>
+    </p:extLst>
+  </p:cSld>
+  <p:clrMap bg1="lt1" tx1="dk1" bg2="lt2" tx2="dk2" accent1="accent1" accent2="accent2" accent3="accent3" accent4="accent4" accent5="accent5" accent6="accent6" hlink="hlink" folHlink="folHlink"/>
+  <p:hf sldNum="0" hdr="0" ftr="0" dt="0"/>
+</p:handoutMaster>
+</file>
+
+<file path=ppt/notesMasters/notesMaster1.xml><?xml version="1.0" encoding="utf-8"?>
+<p:notesMaster xmlns:a="http://schemas.openxmlformats.org/drawingml/2006/main" xmlns:r="http://schemas.openxmlformats.org/officeDocument/2006/relationships" xmlns:p="http://schemas.openxmlformats.org/presentationml/2006/main">
+  <p:cSld>
+    <p:bg>
+      <p:bgRef idx="1001">
+        <a:schemeClr val="bg1"/>
+      </p:bgRef>
+    </p:bg>
+    <p:spTree>
+      <p:nvGrpSpPr>
+        <p:cNvPr id="1" name=""/>
+        <p:cNvGrpSpPr/>
+        <p:nvPr/>
+      </p:nvGrpSpPr>
+      <p:grpSpPr>
+        <a:xfrm>
+          <a:off x="0" y="0"/>
+          <a:ext cx="0" cy="0"/>
+          <a:chOff x="0" y="0"/>
+          <a:chExt cx="0" cy="0"/>
+        </a:xfrm>
+      </p:grpSpPr>
+      <p:sp>
+        <p:nvSpPr>
+          <p:cNvPr id="2" name="页眉占位符 1"/>
+          <p:cNvSpPr>
+            <a:spLocks noGrp="1"/>
+          </p:cNvSpPr>
+          <p:nvPr>
+            <p:ph type="hdr" sz="quarter"/>
+          </p:nvPr>
+        </p:nvSpPr>
+        <p:spPr>
+          <a:xfrm>
+            <a:off x="1" y="0"/>
+            <a:ext cx="4434999" cy="356848"/>
+          </a:xfrm>
+          <a:prstGeom prst="rect">
+            <a:avLst/>
+          </a:prstGeom>
+        </p:spPr>
+        <p:txBody>
+          <a:bodyPr vert="horz" lIns="96645" tIns="48323" rIns="96645" bIns="48323" rtlCol="0"/>
+          <a:lstStyle>
+            <a:lvl1pPr algn="l">
+              <a:defRPr sz="1300"/>
+            </a:lvl1pPr>
+          </a:lstStyle>
+          <a:p>
+            <a:endParaRPr lang="zh-CN" altLang="en-US"/>
+          </a:p>
+        </p:txBody>
+      </p:sp>
+      <p:sp>
+        <p:nvSpPr>
+          <p:cNvPr id="3" name="日期占位符 2"/>
+          <p:cNvSpPr>
+            <a:spLocks noGrp="1"/>
+          </p:cNvSpPr>
+          <p:nvPr>
+            <p:ph type="dt" idx="1"/>
+          </p:nvPr>
+        </p:nvSpPr>
+        <p:spPr>
+          <a:xfrm>
+            <a:off x="5797838" y="0"/>
+            <a:ext cx="4434999" cy="356848"/>
+          </a:xfrm>
+          <a:prstGeom prst="rect">
+            <a:avLst/>
+          </a:prstGeom>
+        </p:spPr>
+        <p:txBody>
+          <a:bodyPr vert="horz" lIns="96645" tIns="48323" rIns="96645" bIns="48323" rtlCol="0"/>
+          <a:lstStyle>
+            <a:lvl1pPr algn="r">
+              <a:defRPr sz="1300"/>
+            </a:lvl1pPr>
+          </a:lstStyle>
+          <a:p>
+            <a:fld id="{002F3B7A-C25F-4CE1-8FEE-39C6D6ACD16A}" type="datetimeFigureOut">
+              <a:rPr lang="zh-CN" altLang="en-US" smtClean="0"/>
+              <a:t>2024/12/18</a:t>
+            </a:fld>
+            <a:endParaRPr lang="zh-CN" altLang="en-US"/>
+          </a:p>
+        </p:txBody>
+      </p:sp>
+      <p:sp>
+        <p:nvSpPr>
+          <p:cNvPr id="4" name="幻灯片图像占位符 3"/>
+          <p:cNvSpPr>
+            <a:spLocks noGrp="1" noRot="1" noChangeAspect="1"/>
+          </p:cNvSpPr>
+          <p:nvPr>
+            <p:ph type="sldImg" idx="2"/>
+          </p:nvPr>
+        </p:nvSpPr>
+        <p:spPr>
+          <a:xfrm>
+            <a:off x="2984500" y="887413"/>
+            <a:ext cx="4265613" cy="2398712"/>
+          </a:xfrm>
+          <a:prstGeom prst="rect">
+            <a:avLst/>
+          </a:prstGeom>
+          <a:noFill/>
+          <a:ln w="12700">
+            <a:solidFill>
+              <a:prstClr val="black"/>
+            </a:solidFill>
+          </a:ln>
+        </p:spPr>
+        <p:txBody>
+          <a:bodyPr vert="horz" lIns="96645" tIns="48323" rIns="96645" bIns="48323" rtlCol="0" anchor="ctr"/>
+          <a:lstStyle/>
+          <a:p>
+            <a:endParaRPr lang="zh-CN" altLang="en-US"/>
+          </a:p>
+        </p:txBody>
+      </p:sp>
+      <p:sp>
+        <p:nvSpPr>
+          <p:cNvPr id="5" name="备注占位符 4"/>
+          <p:cNvSpPr>
+            <a:spLocks noGrp="1"/>
+          </p:cNvSpPr>
+          <p:nvPr>
+            <p:ph type="body" sz="quarter" idx="3"/>
+          </p:nvPr>
+        </p:nvSpPr>
+        <p:spPr>
+          <a:xfrm>
+            <a:off x="1023462" y="3418832"/>
+            <a:ext cx="8187690" cy="2797224"/>
+          </a:xfrm>
+          <a:prstGeom prst="rect">
+            <a:avLst/>
+          </a:prstGeom>
+        </p:spPr>
+        <p:txBody>
+          <a:bodyPr vert="horz" lIns="96645" tIns="48323" rIns="96645" bIns="48323" rtlCol="0"/>
+          <a:lstStyle/>
+          <a:p>
+            <a:pPr lvl="0"/>
+            <a:r>
+              <a:rPr lang="zh-CN" altLang="en-US"/>
+              <a:t>单击此处编辑母版文本样式</a:t>
+            </a:r>
+          </a:p>
+          <a:p>
+            <a:pPr lvl="1"/>
+            <a:r>
+              <a:rPr lang="zh-CN" altLang="en-US"/>
+              <a:t>二级</a:t>
+            </a:r>
+          </a:p>
+          <a:p>
+            <a:pPr lvl="2"/>
+            <a:r>
+              <a:rPr lang="zh-CN" altLang="en-US"/>
+              <a:t>三级</a:t>
+            </a:r>
+          </a:p>
+          <a:p>
+            <a:pPr lvl="3"/>
+            <a:r>
+              <a:rPr lang="zh-CN" altLang="en-US"/>
+              <a:t>四级</a:t>
+            </a:r>
+          </a:p>
+          <a:p>
+            <a:pPr lvl="4"/>
+            <a:r>
+              <a:rPr lang="zh-CN" altLang="en-US"/>
+              <a:t>五级</a:t>
+            </a:r>
+          </a:p>
+        </p:txBody>
+      </p:sp>
+      <p:sp>
+        <p:nvSpPr>
+          <p:cNvPr id="6" name="页脚占位符 5"/>
+          <p:cNvSpPr>
+            <a:spLocks noGrp="1"/>
+          </p:cNvSpPr>
+          <p:nvPr>
+            <p:ph type="ftr" sz="quarter" idx="4"/>
+          </p:nvPr>
+        </p:nvSpPr>
+        <p:spPr>
+          <a:xfrm>
+            <a:off x="1" y="6747217"/>
+            <a:ext cx="4434999" cy="356847"/>
+          </a:xfrm>
+          <a:prstGeom prst="rect">
+            <a:avLst/>
+          </a:prstGeom>
+        </p:spPr>
+        <p:txBody>
+          <a:bodyPr vert="horz" lIns="96645" tIns="48323" rIns="96645" bIns="48323" rtlCol="0" anchor="b"/>
+          <a:lstStyle>
+            <a:lvl1pPr algn="l">
+              <a:defRPr sz="1300"/>
+            </a:lvl1pPr>
+          </a:lstStyle>
+          <a:p>
+            <a:endParaRPr lang="zh-CN" altLang="en-US"/>
+          </a:p>
+        </p:txBody>
+      </p:sp>
+      <p:sp>
+        <p:nvSpPr>
+          <p:cNvPr id="7" name="灯片编号占位符 6"/>
+          <p:cNvSpPr>
+            <a:spLocks noGrp="1"/>
+          </p:cNvSpPr>
+          <p:nvPr>
+            <p:ph type="sldNum" sz="quarter" idx="5"/>
+          </p:nvPr>
+        </p:nvSpPr>
+        <p:spPr>
+          <a:xfrm>
+            <a:off x="5797838" y="6747217"/>
+            <a:ext cx="4434999" cy="356847"/>
+          </a:xfrm>
+          <a:prstGeom prst="rect">
+            <a:avLst/>
+          </a:prstGeom>
+        </p:spPr>
+        <p:txBody>
+          <a:bodyPr vert="horz" lIns="96645" tIns="48323" rIns="96645" bIns="48323" rtlCol="0" anchor="b"/>
+          <a:lstStyle>
+            <a:lvl1pPr algn="r">
+              <a:defRPr sz="1300"/>
+            </a:lvl1pPr>
+          </a:lstStyle>
+          <a:p>
+            <a:fld id="{86C45646-8B8D-4071-B4CD-95D56DF2F426}" type="slidenum">
+              <a:rPr lang="zh-CN" altLang="en-US" smtClean="0"/>
+              <a:t>‹#›</a:t>
+            </a:fld>
+            <a:endParaRPr lang="zh-CN" altLang="en-US"/>
+          </a:p>
+        </p:txBody>
+      </p:sp>
+    </p:spTree>
+    <p:extLst>
+      <p:ext uri="{BB962C8B-B14F-4D97-AF65-F5344CB8AC3E}">
+        <p14:creationId xmlns:p14="http://schemas.microsoft.com/office/powerpoint/2010/main" val="4083582664"/>
+      </p:ext>
+    </p:extLst>
+  </p:cSld>
+  <p:clrMap bg1="lt1" tx1="dk1" bg2="lt2" tx2="dk2" accent1="accent1" accent2="accent2" accent3="accent3" accent4="accent4" accent5="accent5" accent6="accent6" hlink="hlink" folHlink="folHlink"/>
+  <p:hf sldNum="0" hdr="0" ftr="0" dt="0"/>
+  <p:notesStyle>
+    <a:lvl1pPr marL="0" algn="l" defTabSz="914400" rtl="0" eaLnBrk="1" latinLnBrk="0" hangingPunct="1">
+      <a:defRPr sz="1200" kern="1200">
+        <a:solidFill>
+          <a:schemeClr val="tx1"/>
+        </a:solidFill>
+        <a:latin typeface="+mn-lt"/>
+        <a:ea typeface="+mn-ea"/>
+        <a:cs typeface="+mn-cs"/>
+      </a:defRPr>
+    </a:lvl1pPr>
+    <a:lvl2pPr marL="457200" algn="l" defTabSz="914400" rtl="0" eaLnBrk="1" latinLnBrk="0" hangingPunct="1">
+      <a:defRPr sz="1200" kern="1200">
+        <a:solidFill>
+          <a:schemeClr val="tx1"/>
+        </a:solidFill>
+        <a:latin typeface="+mn-lt"/>
+        <a:ea typeface="+mn-ea"/>
+        <a:cs typeface="+mn-cs"/>
+      </a:defRPr>
+    </a:lvl2pPr>
+    <a:lvl3pPr marL="914400" algn="l" defTabSz="914400" rtl="0" eaLnBrk="1" latinLnBrk="0" hangingPunct="1">
+      <a:defRPr sz="1200" kern="1200">
+        <a:solidFill>
+          <a:schemeClr val="tx1"/>
+        </a:solidFill>
+        <a:latin typeface="+mn-lt"/>
+        <a:ea typeface="+mn-ea"/>
+        <a:cs typeface="+mn-cs"/>
+      </a:defRPr>
+    </a:lvl3pPr>
+    <a:lvl4pPr marL="1371600" algn="l" defTabSz="914400" rtl="0" eaLnBrk="1" latinLnBrk="0" hangingPunct="1">
+      <a:defRPr sz="1200" kern="1200">
+        <a:solidFill>
+          <a:schemeClr val="tx1"/>
+        </a:solidFill>
+        <a:latin typeface="+mn-lt"/>
+        <a:ea typeface="+mn-ea"/>
+        <a:cs typeface="+mn-cs"/>
+      </a:defRPr>
+    </a:lvl4pPr>
+    <a:lvl5pPr marL="1828800" algn="l" defTabSz="914400" rtl="0" eaLnBrk="1" latinLnBrk="0" hangingPunct="1">
+      <a:defRPr sz="1200" kern="1200">
+        <a:solidFill>
+          <a:schemeClr val="tx1"/>
+        </a:solidFill>
+        <a:latin typeface="+mn-lt"/>
+        <a:ea typeface="+mn-ea"/>
+        <a:cs typeface="+mn-cs"/>
+      </a:defRPr>
+    </a:lvl5pPr>
+    <a:lvl6pPr marL="2286000" algn="l" defTabSz="914400" rtl="0" eaLnBrk="1" latinLnBrk="0" hangingPunct="1">
+      <a:defRPr sz="1200" kern="1200">
+        <a:solidFill>
+          <a:schemeClr val="tx1"/>
+        </a:solidFill>
+        <a:latin typeface="+mn-lt"/>
+        <a:ea typeface="+mn-ea"/>
+        <a:cs typeface="+mn-cs"/>
+      </a:defRPr>
+    </a:lvl6pPr>
+    <a:lvl7pPr marL="2743200" algn="l" defTabSz="914400" rtl="0" eaLnBrk="1" latinLnBrk="0" hangingPunct="1">
+      <a:defRPr sz="1200" kern="1200">
+        <a:solidFill>
+          <a:schemeClr val="tx1"/>
+        </a:solidFill>
+        <a:latin typeface="+mn-lt"/>
+        <a:ea typeface="+mn-ea"/>
+        <a:cs typeface="+mn-cs"/>
+      </a:defRPr>
+    </a:lvl7pPr>
+    <a:lvl8pPr marL="3200400" algn="l" defTabSz="914400" rtl="0" eaLnBrk="1" latinLnBrk="0" hangingPunct="1">
+      <a:defRPr sz="1200" kern="1200">
+        <a:solidFill>
+          <a:schemeClr val="tx1"/>
+        </a:solidFill>
+        <a:latin typeface="+mn-lt"/>
+        <a:ea typeface="+mn-ea"/>
+        <a:cs typeface="+mn-cs"/>
+      </a:defRPr>
+    </a:lvl8pPr>
+    <a:lvl9pPr marL="3657600" algn="l" defTabSz="914400" rtl="0" eaLnBrk="1" latinLnBrk="0" hangingPunct="1">
+      <a:defRPr sz="1200" kern="1200">
+        <a:solidFill>
+          <a:schemeClr val="tx1"/>
+        </a:solidFill>
+        <a:latin typeface="+mn-lt"/>
+        <a:ea typeface="+mn-ea"/>
+        <a:cs typeface="+mn-cs"/>
+      </a:defRPr>
+    </a:lvl9pPr>
+  </p:notesStyle>
+</p:notesMaster>
+</file>
+
 <file path=ppt/slideLayouts/slideLayout1.xml><?xml version="1.0" encoding="utf-8"?>
 <p:sldLayout xmlns:a="http://schemas.openxmlformats.org/drawingml/2006/main" xmlns:r="http://schemas.openxmlformats.org/officeDocument/2006/relationships" xmlns:p="http://schemas.openxmlformats.org/presentationml/2006/main" preserve="1" userDrawn="1">
   <p:cSld name="标题幻灯片">
@@ -359,10 +905,6 @@
           <a:bodyPr/>
           <a:lstStyle/>
           <a:p>
-            <a:fld id="{5233C8C7-F8F0-45E5-B257-B695ED03E8DF}" type="datetimeFigureOut">
-              <a:rPr lang="zh-CN" altLang="en-US" smtClean="0"/>
-              <a:t>2023/12/10</a:t>
-            </a:fld>
             <a:endParaRPr lang="zh-CN" altLang="en-US"/>
           </a:p>
         </p:txBody>
@@ -467,6 +1009,7 @@
   <p:sldLayoutIdLst>
     <p:sldLayoutId id="2147483651" r:id="rId1"/>
   </p:sldLayoutIdLst>
+  <p:hf sldNum="0" hdr="0" ftr="0" dt="0"/>
   <p:txStyles>
     <p:titleStyle>
       <a:lvl1pPr algn="l" defTabSz="914400" rtl="0" eaLnBrk="1" latinLnBrk="0" hangingPunct="1">
@@ -814,6 +1357,7 @@
     <p:sldLayoutId id="2147483649" r:id="rId1"/>
     <p:sldLayoutId id="2147483652" r:id="rId2"/>
   </p:sldLayoutIdLst>
+  <p:hf sldNum="0" hdr="0" ftr="0" dt="0"/>
   <p:txStyles>
     <p:titleStyle>
       <a:lvl1pPr algn="l" defTabSz="914400" rtl="0" eaLnBrk="1" latinLnBrk="0" hangingPunct="1">
@@ -6698,336 +7242,6 @@
       </p:cxnSp>
       <p:sp>
         <p:nvSpPr>
-          <p:cNvPr id="2" name="左大括号 1">
-            <a:extLst>
-              <a:ext uri="{FF2B5EF4-FFF2-40B4-BE49-F238E27FC236}">
-                <a16:creationId xmlns:a16="http://schemas.microsoft.com/office/drawing/2014/main" id="{07F91A2A-5FC7-6FBE-6B91-3BD12644DABF}"/>
-              </a:ext>
-            </a:extLst>
-          </p:cNvPr>
-          <p:cNvSpPr/>
-          <p:nvPr/>
-        </p:nvSpPr>
-        <p:spPr>
-          <a:xfrm rot="10800000">
-            <a:off x="10118725" y="2387808"/>
-            <a:ext cx="417184" cy="1172940"/>
-          </a:xfrm>
-          <a:prstGeom prst="leftBrace">
-            <a:avLst>
-              <a:gd name="adj1" fmla="val 21655"/>
-              <a:gd name="adj2" fmla="val 50551"/>
-            </a:avLst>
-          </a:prstGeom>
-          <a:ln w="28575">
-            <a:solidFill>
-              <a:schemeClr val="accent4">
-                <a:lumMod val="75000"/>
-                <a:alpha val="69804"/>
-              </a:schemeClr>
-            </a:solidFill>
-          </a:ln>
-        </p:spPr>
-        <p:style>
-          <a:lnRef idx="1">
-            <a:schemeClr val="accent1"/>
-          </a:lnRef>
-          <a:fillRef idx="0">
-            <a:schemeClr val="accent1"/>
-          </a:fillRef>
-          <a:effectRef idx="0">
-            <a:schemeClr val="accent1"/>
-          </a:effectRef>
-          <a:fontRef idx="minor">
-            <a:schemeClr val="tx1"/>
-          </a:fontRef>
-        </p:style>
-        <p:txBody>
-          <a:bodyPr rtlCol="0" anchor="ctr"/>
-          <a:lstStyle/>
-          <a:p>
-            <a:pPr algn="ctr"/>
-            <a:endParaRPr lang="zh-CN" altLang="en-US"/>
-          </a:p>
-        </p:txBody>
-      </p:sp>
-      <p:sp>
-        <p:nvSpPr>
-          <p:cNvPr id="9" name="文本框 8">
-            <a:extLst>
-              <a:ext uri="{FF2B5EF4-FFF2-40B4-BE49-F238E27FC236}">
-                <a16:creationId xmlns:a16="http://schemas.microsoft.com/office/drawing/2014/main" id="{B8471C1D-2200-4F4F-8FED-D15431D6918D}"/>
-              </a:ext>
-            </a:extLst>
-          </p:cNvPr>
-          <p:cNvSpPr txBox="1"/>
-          <p:nvPr/>
-        </p:nvSpPr>
-        <p:spPr>
-          <a:xfrm>
-            <a:off x="10535442" y="2726908"/>
-            <a:ext cx="1121834" cy="565146"/>
-          </a:xfrm>
-          <a:prstGeom prst="rect">
-            <a:avLst/>
-          </a:prstGeom>
-          <a:noFill/>
-        </p:spPr>
-        <p:txBody>
-          <a:bodyPr wrap="square" lIns="36000" tIns="36000" rIns="36000" bIns="36000" rtlCol="0">
-            <a:spAutoFit/>
-          </a:bodyPr>
-          <a:lstStyle/>
-          <a:p>
-            <a:pPr algn="ctr"/>
-            <a:r>
-              <a:rPr lang="en-US" altLang="zh-CN" sz="1600" b="1" dirty="0">
-                <a:solidFill>
-                  <a:schemeClr val="accent4">
-                    <a:lumMod val="75000"/>
-                  </a:schemeClr>
-                </a:solidFill>
-              </a:rPr>
-              <a:t>Analog</a:t>
-            </a:r>
-            <a:br>
-              <a:rPr lang="en-US" altLang="zh-CN" sz="1600" b="1" dirty="0">
-                <a:solidFill>
-                  <a:schemeClr val="accent4">
-                    <a:lumMod val="75000"/>
-                  </a:schemeClr>
-                </a:solidFill>
-              </a:rPr>
-            </a:br>
-            <a:r>
-              <a:rPr lang="en-US" altLang="zh-CN" sz="1600" b="1" dirty="0">
-                <a:solidFill>
-                  <a:schemeClr val="accent4">
-                    <a:lumMod val="75000"/>
-                  </a:schemeClr>
-                </a:solidFill>
-              </a:rPr>
-              <a:t>Deadzone</a:t>
-            </a:r>
-            <a:endParaRPr lang="zh-CN" altLang="en-US" sz="1600" b="1" dirty="0">
-              <a:solidFill>
-                <a:schemeClr val="accent4">
-                  <a:lumMod val="75000"/>
-                </a:schemeClr>
-              </a:solidFill>
-            </a:endParaRPr>
-          </a:p>
-        </p:txBody>
-      </p:sp>
-      <p:sp>
-        <p:nvSpPr>
-          <p:cNvPr id="10" name="矩形: 圆角 9">
-            <a:extLst>
-              <a:ext uri="{FF2B5EF4-FFF2-40B4-BE49-F238E27FC236}">
-                <a16:creationId xmlns:a16="http://schemas.microsoft.com/office/drawing/2014/main" id="{B152DA46-81F0-54FD-59E7-65C6A819093C}"/>
-              </a:ext>
-            </a:extLst>
-          </p:cNvPr>
-          <p:cNvSpPr/>
-          <p:nvPr/>
-        </p:nvSpPr>
-        <p:spPr>
-          <a:xfrm>
-            <a:off x="7210835" y="2412705"/>
-            <a:ext cx="694445" cy="1120685"/>
-          </a:xfrm>
-          <a:prstGeom prst="roundRect">
-            <a:avLst>
-              <a:gd name="adj" fmla="val 9697"/>
-            </a:avLst>
-          </a:prstGeom>
-          <a:solidFill>
-            <a:schemeClr val="accent4">
-              <a:lumMod val="75000"/>
-              <a:alpha val="30196"/>
-            </a:schemeClr>
-          </a:solidFill>
-          <a:ln>
-            <a:noFill/>
-          </a:ln>
-        </p:spPr>
-        <p:style>
-          <a:lnRef idx="2">
-            <a:schemeClr val="accent1">
-              <a:shade val="50000"/>
-            </a:schemeClr>
-          </a:lnRef>
-          <a:fillRef idx="1">
-            <a:schemeClr val="accent1"/>
-          </a:fillRef>
-          <a:effectRef idx="0">
-            <a:schemeClr val="accent1"/>
-          </a:effectRef>
-          <a:fontRef idx="minor">
-            <a:schemeClr val="lt1"/>
-          </a:fontRef>
-        </p:style>
-        <p:txBody>
-          <a:bodyPr rtlCol="0" anchor="b"/>
-          <a:lstStyle/>
-          <a:p>
-            <a:pPr algn="ctr"/>
-            <a:r>
-              <a:rPr lang="en-US" altLang="zh-CN" sz="1300" b="1" dirty="0">
-                <a:solidFill>
-                  <a:schemeClr val="accent4">
-                    <a:lumMod val="75000"/>
-                  </a:schemeClr>
-                </a:solidFill>
-              </a:rPr>
-              <a:t>1.4°</a:t>
-            </a:r>
-            <a:endParaRPr lang="zh-CN" altLang="en-US" sz="1300" b="1" dirty="0">
-              <a:solidFill>
-                <a:schemeClr val="accent4">
-                  <a:lumMod val="75000"/>
-                </a:schemeClr>
-              </a:solidFill>
-            </a:endParaRPr>
-          </a:p>
-        </p:txBody>
-      </p:sp>
-      <p:sp>
-        <p:nvSpPr>
-          <p:cNvPr id="18" name="矩形: 圆角 17">
-            <a:extLst>
-              <a:ext uri="{FF2B5EF4-FFF2-40B4-BE49-F238E27FC236}">
-                <a16:creationId xmlns:a16="http://schemas.microsoft.com/office/drawing/2014/main" id="{9A948D97-BA1A-FC99-ADFD-7A4F98106EF7}"/>
-              </a:ext>
-            </a:extLst>
-          </p:cNvPr>
-          <p:cNvSpPr/>
-          <p:nvPr/>
-        </p:nvSpPr>
-        <p:spPr>
-          <a:xfrm>
-            <a:off x="8222426" y="2412705"/>
-            <a:ext cx="694445" cy="1120685"/>
-          </a:xfrm>
-          <a:prstGeom prst="roundRect">
-            <a:avLst>
-              <a:gd name="adj" fmla="val 9697"/>
-            </a:avLst>
-          </a:prstGeom>
-          <a:solidFill>
-            <a:schemeClr val="accent4">
-              <a:lumMod val="75000"/>
-              <a:alpha val="30196"/>
-            </a:schemeClr>
-          </a:solidFill>
-          <a:ln>
-            <a:noFill/>
-          </a:ln>
-        </p:spPr>
-        <p:style>
-          <a:lnRef idx="2">
-            <a:schemeClr val="accent1">
-              <a:shade val="50000"/>
-            </a:schemeClr>
-          </a:lnRef>
-          <a:fillRef idx="1">
-            <a:schemeClr val="accent1"/>
-          </a:fillRef>
-          <a:effectRef idx="0">
-            <a:schemeClr val="accent1"/>
-          </a:effectRef>
-          <a:fontRef idx="minor">
-            <a:schemeClr val="lt1"/>
-          </a:fontRef>
-        </p:style>
-        <p:txBody>
-          <a:bodyPr rtlCol="0" anchor="b"/>
-          <a:lstStyle/>
-          <a:p>
-            <a:pPr algn="ctr"/>
-            <a:r>
-              <a:rPr lang="en-US" altLang="zh-CN" sz="1300" b="1" dirty="0">
-                <a:solidFill>
-                  <a:schemeClr val="accent4">
-                    <a:lumMod val="75000"/>
-                  </a:schemeClr>
-                </a:solidFill>
-              </a:rPr>
-              <a:t>2.8°</a:t>
-            </a:r>
-            <a:endParaRPr lang="zh-CN" altLang="en-US" sz="1300" b="1" dirty="0"/>
-          </a:p>
-        </p:txBody>
-      </p:sp>
-      <p:sp>
-        <p:nvSpPr>
-          <p:cNvPr id="21" name="矩形: 圆角 20">
-            <a:extLst>
-              <a:ext uri="{FF2B5EF4-FFF2-40B4-BE49-F238E27FC236}">
-                <a16:creationId xmlns:a16="http://schemas.microsoft.com/office/drawing/2014/main" id="{ED6C52A8-4108-1ABD-A6E3-CA9F55351877}"/>
-              </a:ext>
-            </a:extLst>
-          </p:cNvPr>
-          <p:cNvSpPr/>
-          <p:nvPr/>
-        </p:nvSpPr>
-        <p:spPr>
-          <a:xfrm>
-            <a:off x="9233780" y="2411958"/>
-            <a:ext cx="694445" cy="1120685"/>
-          </a:xfrm>
-          <a:prstGeom prst="roundRect">
-            <a:avLst>
-              <a:gd name="adj" fmla="val 9697"/>
-            </a:avLst>
-          </a:prstGeom>
-          <a:solidFill>
-            <a:schemeClr val="accent4">
-              <a:lumMod val="75000"/>
-              <a:alpha val="30196"/>
-            </a:schemeClr>
-          </a:solidFill>
-          <a:ln>
-            <a:noFill/>
-          </a:ln>
-        </p:spPr>
-        <p:style>
-          <a:lnRef idx="2">
-            <a:schemeClr val="accent1">
-              <a:shade val="50000"/>
-            </a:schemeClr>
-          </a:lnRef>
-          <a:fillRef idx="1">
-            <a:schemeClr val="accent1"/>
-          </a:fillRef>
-          <a:effectRef idx="0">
-            <a:schemeClr val="accent1"/>
-          </a:effectRef>
-          <a:fontRef idx="minor">
-            <a:schemeClr val="lt1"/>
-          </a:fontRef>
-        </p:style>
-        <p:txBody>
-          <a:bodyPr rtlCol="0" anchor="b"/>
-          <a:lstStyle/>
-          <a:p>
-            <a:pPr algn="ctr"/>
-            <a:r>
-              <a:rPr lang="en-US" altLang="zh-CN" sz="1300" b="1" dirty="0">
-                <a:solidFill>
-                  <a:schemeClr val="accent4">
-                    <a:lumMod val="75000"/>
-                  </a:schemeClr>
-                </a:solidFill>
-              </a:rPr>
-              <a:t>4.2°</a:t>
-            </a:r>
-            <a:endParaRPr lang="zh-CN" altLang="en-US" sz="1300" b="1" dirty="0"/>
-          </a:p>
-        </p:txBody>
-      </p:sp>
-      <p:sp>
-        <p:nvSpPr>
           <p:cNvPr id="27" name="文本框 26">
             <a:extLst>
               <a:ext uri="{FF2B5EF4-FFF2-40B4-BE49-F238E27FC236}">
@@ -8232,4 +8446,594 @@
     </a:ext>
   </a:extLst>
 </a:theme>
+</file>
+
+<file path=ppt/theme/theme3.xml><?xml version="1.0" encoding="utf-8"?>
+<a:theme xmlns:a="http://schemas.openxmlformats.org/drawingml/2006/main" name="Office 主题​​">
+  <a:themeElements>
+    <a:clrScheme name="Office">
+      <a:dk1>
+        <a:sysClr val="windowText" lastClr="000000"/>
+      </a:dk1>
+      <a:lt1>
+        <a:sysClr val="window" lastClr="FFFFFF"/>
+      </a:lt1>
+      <a:dk2>
+        <a:srgbClr val="44546A"/>
+      </a:dk2>
+      <a:lt2>
+        <a:srgbClr val="E7E6E6"/>
+      </a:lt2>
+      <a:accent1>
+        <a:srgbClr val="4472C4"/>
+      </a:accent1>
+      <a:accent2>
+        <a:srgbClr val="ED7D31"/>
+      </a:accent2>
+      <a:accent3>
+        <a:srgbClr val="A5A5A5"/>
+      </a:accent3>
+      <a:accent4>
+        <a:srgbClr val="FFC000"/>
+      </a:accent4>
+      <a:accent5>
+        <a:srgbClr val="5B9BD5"/>
+      </a:accent5>
+      <a:accent6>
+        <a:srgbClr val="70AD47"/>
+      </a:accent6>
+      <a:hlink>
+        <a:srgbClr val="0563C1"/>
+      </a:hlink>
+      <a:folHlink>
+        <a:srgbClr val="954F72"/>
+      </a:folHlink>
+    </a:clrScheme>
+    <a:fontScheme name="Office">
+      <a:majorFont>
+        <a:latin typeface="等线 Light" panose="020F0302020204030204"/>
+        <a:ea typeface=""/>
+        <a:cs typeface=""/>
+        <a:font script="Jpan" typeface="游ゴシック Light"/>
+        <a:font script="Hang" typeface="맑은 고딕"/>
+        <a:font script="Hans" typeface="等线 Light"/>
+        <a:font script="Hant" typeface="新細明體"/>
+        <a:font script="Arab" typeface="Times New Roman"/>
+        <a:font script="Hebr" typeface="Times New Roman"/>
+        <a:font script="Thai" typeface="Angsana New"/>
+        <a:font script="Ethi" typeface="Nyala"/>
+        <a:font script="Beng" typeface="Vrinda"/>
+        <a:font script="Gujr" typeface="Shruti"/>
+        <a:font script="Khmr" typeface="MoolBoran"/>
+        <a:font script="Knda" typeface="Tunga"/>
+        <a:font script="Guru" typeface="Raavi"/>
+        <a:font script="Cans" typeface="Euphemia"/>
+        <a:font script="Cher" typeface="Plantagenet Cherokee"/>
+        <a:font script="Yiii" typeface="Microsoft Yi Baiti"/>
+        <a:font script="Tibt" typeface="Microsoft Himalaya"/>
+        <a:font script="Thaa" typeface="MV Boli"/>
+        <a:font script="Deva" typeface="Mangal"/>
+        <a:font script="Telu" typeface="Gautami"/>
+        <a:font script="Taml" typeface="Latha"/>
+        <a:font script="Syrc" typeface="Estrangelo Edessa"/>
+        <a:font script="Orya" typeface="Kalinga"/>
+        <a:font script="Mlym" typeface="Kartika"/>
+        <a:font script="Laoo" typeface="DokChampa"/>
+        <a:font script="Sinh" typeface="Iskoola Pota"/>
+        <a:font script="Mong" typeface="Mongolian Baiti"/>
+        <a:font script="Viet" typeface="Times New Roman"/>
+        <a:font script="Uigh" typeface="Microsoft Uighur"/>
+        <a:font script="Geor" typeface="Sylfaen"/>
+        <a:font script="Armn" typeface="Arial"/>
+        <a:font script="Bugi" typeface="Leelawadee UI"/>
+        <a:font script="Bopo" typeface="Microsoft JhengHei"/>
+        <a:font script="Java" typeface="Javanese Text"/>
+        <a:font script="Lisu" typeface="Segoe UI"/>
+        <a:font script="Mymr" typeface="Myanmar Text"/>
+        <a:font script="Nkoo" typeface="Ebrima"/>
+        <a:font script="Olck" typeface="Nirmala UI"/>
+        <a:font script="Osma" typeface="Ebrima"/>
+        <a:font script="Phag" typeface="Phagspa"/>
+        <a:font script="Syrn" typeface="Estrangelo Edessa"/>
+        <a:font script="Syrj" typeface="Estrangelo Edessa"/>
+        <a:font script="Syre" typeface="Estrangelo Edessa"/>
+        <a:font script="Sora" typeface="Nirmala UI"/>
+        <a:font script="Tale" typeface="Microsoft Tai Le"/>
+        <a:font script="Talu" typeface="Microsoft New Tai Lue"/>
+        <a:font script="Tfng" typeface="Ebrima"/>
+      </a:majorFont>
+      <a:minorFont>
+        <a:latin typeface="等线" panose="020F0502020204030204"/>
+        <a:ea typeface=""/>
+        <a:cs typeface=""/>
+        <a:font script="Jpan" typeface="游ゴシック"/>
+        <a:font script="Hang" typeface="맑은 고딕"/>
+        <a:font script="Hans" typeface="等线"/>
+        <a:font script="Hant" typeface="新細明體"/>
+        <a:font script="Arab" typeface="Arial"/>
+        <a:font script="Hebr" typeface="Arial"/>
+        <a:font script="Thai" typeface="Cordia New"/>
+        <a:font script="Ethi" typeface="Nyala"/>
+        <a:font script="Beng" typeface="Vrinda"/>
+        <a:font script="Gujr" typeface="Shruti"/>
+        <a:font script="Khmr" typeface="DaunPenh"/>
+        <a:font script="Knda" typeface="Tunga"/>
+        <a:font script="Guru" typeface="Raavi"/>
+        <a:font script="Cans" typeface="Euphemia"/>
+        <a:font script="Cher" typeface="Plantagenet Cherokee"/>
+        <a:font script="Yiii" typeface="Microsoft Yi Baiti"/>
+        <a:font script="Tibt" typeface="Microsoft Himalaya"/>
+        <a:font script="Thaa" typeface="MV Boli"/>
+        <a:font script="Deva" typeface="Mangal"/>
+        <a:font script="Telu" typeface="Gautami"/>
+        <a:font script="Taml" typeface="Latha"/>
+        <a:font script="Syrc" typeface="Estrangelo Edessa"/>
+        <a:font script="Orya" typeface="Kalinga"/>
+        <a:font script="Mlym" typeface="Kartika"/>
+        <a:font script="Laoo" typeface="DokChampa"/>
+        <a:font script="Sinh" typeface="Iskoola Pota"/>
+        <a:font script="Mong" typeface="Mongolian Baiti"/>
+        <a:font script="Viet" typeface="Arial"/>
+        <a:font script="Uigh" typeface="Microsoft Uighur"/>
+        <a:font script="Geor" typeface="Sylfaen"/>
+        <a:font script="Armn" typeface="Arial"/>
+        <a:font script="Bugi" typeface="Leelawadee UI"/>
+        <a:font script="Bopo" typeface="Microsoft JhengHei"/>
+        <a:font script="Java" typeface="Javanese Text"/>
+        <a:font script="Lisu" typeface="Segoe UI"/>
+        <a:font script="Mymr" typeface="Myanmar Text"/>
+        <a:font script="Nkoo" typeface="Ebrima"/>
+        <a:font script="Olck" typeface="Nirmala UI"/>
+        <a:font script="Osma" typeface="Ebrima"/>
+        <a:font script="Phag" typeface="Phagspa"/>
+        <a:font script="Syrn" typeface="Estrangelo Edessa"/>
+        <a:font script="Syrj" typeface="Estrangelo Edessa"/>
+        <a:font script="Syre" typeface="Estrangelo Edessa"/>
+        <a:font script="Sora" typeface="Nirmala UI"/>
+        <a:font script="Tale" typeface="Microsoft Tai Le"/>
+        <a:font script="Talu" typeface="Microsoft New Tai Lue"/>
+        <a:font script="Tfng" typeface="Ebrima"/>
+      </a:minorFont>
+    </a:fontScheme>
+    <a:fmtScheme name="Office">
+      <a:fillStyleLst>
+        <a:solidFill>
+          <a:schemeClr val="phClr"/>
+        </a:solidFill>
+        <a:gradFill rotWithShape="1">
+          <a:gsLst>
+            <a:gs pos="0">
+              <a:schemeClr val="phClr">
+                <a:lumMod val="110000"/>
+                <a:satMod val="105000"/>
+                <a:tint val="67000"/>
+              </a:schemeClr>
+            </a:gs>
+            <a:gs pos="50000">
+              <a:schemeClr val="phClr">
+                <a:lumMod val="105000"/>
+                <a:satMod val="103000"/>
+                <a:tint val="73000"/>
+              </a:schemeClr>
+            </a:gs>
+            <a:gs pos="100000">
+              <a:schemeClr val="phClr">
+                <a:lumMod val="105000"/>
+                <a:satMod val="109000"/>
+                <a:tint val="81000"/>
+              </a:schemeClr>
+            </a:gs>
+          </a:gsLst>
+          <a:lin ang="5400000" scaled="0"/>
+        </a:gradFill>
+        <a:gradFill rotWithShape="1">
+          <a:gsLst>
+            <a:gs pos="0">
+              <a:schemeClr val="phClr">
+                <a:satMod val="103000"/>
+                <a:lumMod val="102000"/>
+                <a:tint val="94000"/>
+              </a:schemeClr>
+            </a:gs>
+            <a:gs pos="50000">
+              <a:schemeClr val="phClr">
+                <a:satMod val="110000"/>
+                <a:lumMod val="100000"/>
+                <a:shade val="100000"/>
+              </a:schemeClr>
+            </a:gs>
+            <a:gs pos="100000">
+              <a:schemeClr val="phClr">
+                <a:lumMod val="99000"/>
+                <a:satMod val="120000"/>
+                <a:shade val="78000"/>
+              </a:schemeClr>
+            </a:gs>
+          </a:gsLst>
+          <a:lin ang="5400000" scaled="0"/>
+        </a:gradFill>
+      </a:fillStyleLst>
+      <a:lnStyleLst>
+        <a:ln w="6350" cap="flat" cmpd="sng" algn="ctr">
+          <a:solidFill>
+            <a:schemeClr val="phClr"/>
+          </a:solidFill>
+          <a:prstDash val="solid"/>
+          <a:miter lim="800000"/>
+        </a:ln>
+        <a:ln w="12700" cap="flat" cmpd="sng" algn="ctr">
+          <a:solidFill>
+            <a:schemeClr val="phClr"/>
+          </a:solidFill>
+          <a:prstDash val="solid"/>
+          <a:miter lim="800000"/>
+        </a:ln>
+        <a:ln w="19050" cap="flat" cmpd="sng" algn="ctr">
+          <a:solidFill>
+            <a:schemeClr val="phClr"/>
+          </a:solidFill>
+          <a:prstDash val="solid"/>
+          <a:miter lim="800000"/>
+        </a:ln>
+      </a:lnStyleLst>
+      <a:effectStyleLst>
+        <a:effectStyle>
+          <a:effectLst/>
+        </a:effectStyle>
+        <a:effectStyle>
+          <a:effectLst/>
+        </a:effectStyle>
+        <a:effectStyle>
+          <a:effectLst>
+            <a:outerShdw blurRad="57150" dist="19050" dir="5400000" algn="ctr" rotWithShape="0">
+              <a:srgbClr val="000000">
+                <a:alpha val="63000"/>
+              </a:srgbClr>
+            </a:outerShdw>
+          </a:effectLst>
+        </a:effectStyle>
+      </a:effectStyleLst>
+      <a:bgFillStyleLst>
+        <a:solidFill>
+          <a:schemeClr val="phClr"/>
+        </a:solidFill>
+        <a:solidFill>
+          <a:schemeClr val="phClr">
+            <a:tint val="95000"/>
+            <a:satMod val="170000"/>
+          </a:schemeClr>
+        </a:solidFill>
+        <a:gradFill rotWithShape="1">
+          <a:gsLst>
+            <a:gs pos="0">
+              <a:schemeClr val="phClr">
+                <a:tint val="93000"/>
+                <a:satMod val="150000"/>
+                <a:shade val="98000"/>
+                <a:lumMod val="102000"/>
+              </a:schemeClr>
+            </a:gs>
+            <a:gs pos="50000">
+              <a:schemeClr val="phClr">
+                <a:tint val="98000"/>
+                <a:satMod val="130000"/>
+                <a:shade val="90000"/>
+                <a:lumMod val="103000"/>
+              </a:schemeClr>
+            </a:gs>
+            <a:gs pos="100000">
+              <a:schemeClr val="phClr">
+                <a:shade val="63000"/>
+                <a:satMod val="120000"/>
+              </a:schemeClr>
+            </a:gs>
+          </a:gsLst>
+          <a:lin ang="5400000" scaled="0"/>
+        </a:gradFill>
+      </a:bgFillStyleLst>
+    </a:fmtScheme>
+  </a:themeElements>
+  <a:objectDefaults/>
+  <a:extraClrSchemeLst/>
+  <a:extLst>
+    <a:ext uri="{05A4C25C-085E-4340-85A3-A5531E510DB2}">
+      <thm15:themeFamily xmlns:thm15="http://schemas.microsoft.com/office/thememl/2012/main" name="Office Theme" id="{62F939B6-93AF-4DB8-9C6B-D6C7DFDC589F}" vid="{4A3C46E8-61CC-4603-A589-7422A47A8E4A}"/>
+    </a:ext>
+  </a:extLst>
+</a:theme>
+</file>
+
+<file path=ppt/theme/theme4.xml><?xml version="1.0" encoding="utf-8"?>
+<a:theme xmlns:a="http://schemas.openxmlformats.org/drawingml/2006/main" name="Office 主题​​">
+  <a:themeElements>
+    <a:clrScheme name="Office">
+      <a:dk1>
+        <a:sysClr val="windowText" lastClr="000000"/>
+      </a:dk1>
+      <a:lt1>
+        <a:sysClr val="window" lastClr="FFFFFF"/>
+      </a:lt1>
+      <a:dk2>
+        <a:srgbClr val="44546A"/>
+      </a:dk2>
+      <a:lt2>
+        <a:srgbClr val="E7E6E6"/>
+      </a:lt2>
+      <a:accent1>
+        <a:srgbClr val="4472C4"/>
+      </a:accent1>
+      <a:accent2>
+        <a:srgbClr val="ED7D31"/>
+      </a:accent2>
+      <a:accent3>
+        <a:srgbClr val="A5A5A5"/>
+      </a:accent3>
+      <a:accent4>
+        <a:srgbClr val="FFC000"/>
+      </a:accent4>
+      <a:accent5>
+        <a:srgbClr val="5B9BD5"/>
+      </a:accent5>
+      <a:accent6>
+        <a:srgbClr val="70AD47"/>
+      </a:accent6>
+      <a:hlink>
+        <a:srgbClr val="0563C1"/>
+      </a:hlink>
+      <a:folHlink>
+        <a:srgbClr val="954F72"/>
+      </a:folHlink>
+    </a:clrScheme>
+    <a:fontScheme name="Office">
+      <a:majorFont>
+        <a:latin typeface="等线 Light" panose="020F0302020204030204"/>
+        <a:ea typeface=""/>
+        <a:cs typeface=""/>
+        <a:font script="Jpan" typeface="游ゴシック Light"/>
+        <a:font script="Hang" typeface="맑은 고딕"/>
+        <a:font script="Hans" typeface="等线 Light"/>
+        <a:font script="Hant" typeface="新細明體"/>
+        <a:font script="Arab" typeface="Times New Roman"/>
+        <a:font script="Hebr" typeface="Times New Roman"/>
+        <a:font script="Thai" typeface="Angsana New"/>
+        <a:font script="Ethi" typeface="Nyala"/>
+        <a:font script="Beng" typeface="Vrinda"/>
+        <a:font script="Gujr" typeface="Shruti"/>
+        <a:font script="Khmr" typeface="MoolBoran"/>
+        <a:font script="Knda" typeface="Tunga"/>
+        <a:font script="Guru" typeface="Raavi"/>
+        <a:font script="Cans" typeface="Euphemia"/>
+        <a:font script="Cher" typeface="Plantagenet Cherokee"/>
+        <a:font script="Yiii" typeface="Microsoft Yi Baiti"/>
+        <a:font script="Tibt" typeface="Microsoft Himalaya"/>
+        <a:font script="Thaa" typeface="MV Boli"/>
+        <a:font script="Deva" typeface="Mangal"/>
+        <a:font script="Telu" typeface="Gautami"/>
+        <a:font script="Taml" typeface="Latha"/>
+        <a:font script="Syrc" typeface="Estrangelo Edessa"/>
+        <a:font script="Orya" typeface="Kalinga"/>
+        <a:font script="Mlym" typeface="Kartika"/>
+        <a:font script="Laoo" typeface="DokChampa"/>
+        <a:font script="Sinh" typeface="Iskoola Pota"/>
+        <a:font script="Mong" typeface="Mongolian Baiti"/>
+        <a:font script="Viet" typeface="Times New Roman"/>
+        <a:font script="Uigh" typeface="Microsoft Uighur"/>
+        <a:font script="Geor" typeface="Sylfaen"/>
+        <a:font script="Armn" typeface="Arial"/>
+        <a:font script="Bugi" typeface="Leelawadee UI"/>
+        <a:font script="Bopo" typeface="Microsoft JhengHei"/>
+        <a:font script="Java" typeface="Javanese Text"/>
+        <a:font script="Lisu" typeface="Segoe UI"/>
+        <a:font script="Mymr" typeface="Myanmar Text"/>
+        <a:font script="Nkoo" typeface="Ebrima"/>
+        <a:font script="Olck" typeface="Nirmala UI"/>
+        <a:font script="Osma" typeface="Ebrima"/>
+        <a:font script="Phag" typeface="Phagspa"/>
+        <a:font script="Syrn" typeface="Estrangelo Edessa"/>
+        <a:font script="Syrj" typeface="Estrangelo Edessa"/>
+        <a:font script="Syre" typeface="Estrangelo Edessa"/>
+        <a:font script="Sora" typeface="Nirmala UI"/>
+        <a:font script="Tale" typeface="Microsoft Tai Le"/>
+        <a:font script="Talu" typeface="Microsoft New Tai Lue"/>
+        <a:font script="Tfng" typeface="Ebrima"/>
+      </a:majorFont>
+      <a:minorFont>
+        <a:latin typeface="等线" panose="020F0502020204030204"/>
+        <a:ea typeface=""/>
+        <a:cs typeface=""/>
+        <a:font script="Jpan" typeface="游ゴシック"/>
+        <a:font script="Hang" typeface="맑은 고딕"/>
+        <a:font script="Hans" typeface="等线"/>
+        <a:font script="Hant" typeface="新細明體"/>
+        <a:font script="Arab" typeface="Arial"/>
+        <a:font script="Hebr" typeface="Arial"/>
+        <a:font script="Thai" typeface="Cordia New"/>
+        <a:font script="Ethi" typeface="Nyala"/>
+        <a:font script="Beng" typeface="Vrinda"/>
+        <a:font script="Gujr" typeface="Shruti"/>
+        <a:font script="Khmr" typeface="DaunPenh"/>
+        <a:font script="Knda" typeface="Tunga"/>
+        <a:font script="Guru" typeface="Raavi"/>
+        <a:font script="Cans" typeface="Euphemia"/>
+        <a:font script="Cher" typeface="Plantagenet Cherokee"/>
+        <a:font script="Yiii" typeface="Microsoft Yi Baiti"/>
+        <a:font script="Tibt" typeface="Microsoft Himalaya"/>
+        <a:font script="Thaa" typeface="MV Boli"/>
+        <a:font script="Deva" typeface="Mangal"/>
+        <a:font script="Telu" typeface="Gautami"/>
+        <a:font script="Taml" typeface="Latha"/>
+        <a:font script="Syrc" typeface="Estrangelo Edessa"/>
+        <a:font script="Orya" typeface="Kalinga"/>
+        <a:font script="Mlym" typeface="Kartika"/>
+        <a:font script="Laoo" typeface="DokChampa"/>
+        <a:font script="Sinh" typeface="Iskoola Pota"/>
+        <a:font script="Mong" typeface="Mongolian Baiti"/>
+        <a:font script="Viet" typeface="Arial"/>
+        <a:font script="Uigh" typeface="Microsoft Uighur"/>
+        <a:font script="Geor" typeface="Sylfaen"/>
+        <a:font script="Armn" typeface="Arial"/>
+        <a:font script="Bugi" typeface="Leelawadee UI"/>
+        <a:font script="Bopo" typeface="Microsoft JhengHei"/>
+        <a:font script="Java" typeface="Javanese Text"/>
+        <a:font script="Lisu" typeface="Segoe UI"/>
+        <a:font script="Mymr" typeface="Myanmar Text"/>
+        <a:font script="Nkoo" typeface="Ebrima"/>
+        <a:font script="Olck" typeface="Nirmala UI"/>
+        <a:font script="Osma" typeface="Ebrima"/>
+        <a:font script="Phag" typeface="Phagspa"/>
+        <a:font script="Syrn" typeface="Estrangelo Edessa"/>
+        <a:font script="Syrj" typeface="Estrangelo Edessa"/>
+        <a:font script="Syre" typeface="Estrangelo Edessa"/>
+        <a:font script="Sora" typeface="Nirmala UI"/>
+        <a:font script="Tale" typeface="Microsoft Tai Le"/>
+        <a:font script="Talu" typeface="Microsoft New Tai Lue"/>
+        <a:font script="Tfng" typeface="Ebrima"/>
+      </a:minorFont>
+    </a:fontScheme>
+    <a:fmtScheme name="Office">
+      <a:fillStyleLst>
+        <a:solidFill>
+          <a:schemeClr val="phClr"/>
+        </a:solidFill>
+        <a:gradFill rotWithShape="1">
+          <a:gsLst>
+            <a:gs pos="0">
+              <a:schemeClr val="phClr">
+                <a:lumMod val="110000"/>
+                <a:satMod val="105000"/>
+                <a:tint val="67000"/>
+              </a:schemeClr>
+            </a:gs>
+            <a:gs pos="50000">
+              <a:schemeClr val="phClr">
+                <a:lumMod val="105000"/>
+                <a:satMod val="103000"/>
+                <a:tint val="73000"/>
+              </a:schemeClr>
+            </a:gs>
+            <a:gs pos="100000">
+              <a:schemeClr val="phClr">
+                <a:lumMod val="105000"/>
+                <a:satMod val="109000"/>
+                <a:tint val="81000"/>
+              </a:schemeClr>
+            </a:gs>
+          </a:gsLst>
+          <a:lin ang="5400000" scaled="0"/>
+        </a:gradFill>
+        <a:gradFill rotWithShape="1">
+          <a:gsLst>
+            <a:gs pos="0">
+              <a:schemeClr val="phClr">
+                <a:satMod val="103000"/>
+                <a:lumMod val="102000"/>
+                <a:tint val="94000"/>
+              </a:schemeClr>
+            </a:gs>
+            <a:gs pos="50000">
+              <a:schemeClr val="phClr">
+                <a:satMod val="110000"/>
+                <a:lumMod val="100000"/>
+                <a:shade val="100000"/>
+              </a:schemeClr>
+            </a:gs>
+            <a:gs pos="100000">
+              <a:schemeClr val="phClr">
+                <a:lumMod val="99000"/>
+                <a:satMod val="120000"/>
+                <a:shade val="78000"/>
+              </a:schemeClr>
+            </a:gs>
+          </a:gsLst>
+          <a:lin ang="5400000" scaled="0"/>
+        </a:gradFill>
+      </a:fillStyleLst>
+      <a:lnStyleLst>
+        <a:ln w="6350" cap="flat" cmpd="sng" algn="ctr">
+          <a:solidFill>
+            <a:schemeClr val="phClr"/>
+          </a:solidFill>
+          <a:prstDash val="solid"/>
+          <a:miter lim="800000"/>
+        </a:ln>
+        <a:ln w="12700" cap="flat" cmpd="sng" algn="ctr">
+          <a:solidFill>
+            <a:schemeClr val="phClr"/>
+          </a:solidFill>
+          <a:prstDash val="solid"/>
+          <a:miter lim="800000"/>
+        </a:ln>
+        <a:ln w="19050" cap="flat" cmpd="sng" algn="ctr">
+          <a:solidFill>
+            <a:schemeClr val="phClr"/>
+          </a:solidFill>
+          <a:prstDash val="solid"/>
+          <a:miter lim="800000"/>
+        </a:ln>
+      </a:lnStyleLst>
+      <a:effectStyleLst>
+        <a:effectStyle>
+          <a:effectLst/>
+        </a:effectStyle>
+        <a:effectStyle>
+          <a:effectLst/>
+        </a:effectStyle>
+        <a:effectStyle>
+          <a:effectLst>
+            <a:outerShdw blurRad="57150" dist="19050" dir="5400000" algn="ctr" rotWithShape="0">
+              <a:srgbClr val="000000">
+                <a:alpha val="63000"/>
+              </a:srgbClr>
+            </a:outerShdw>
+          </a:effectLst>
+        </a:effectStyle>
+      </a:effectStyleLst>
+      <a:bgFillStyleLst>
+        <a:solidFill>
+          <a:schemeClr val="phClr"/>
+        </a:solidFill>
+        <a:solidFill>
+          <a:schemeClr val="phClr">
+            <a:tint val="95000"/>
+            <a:satMod val="170000"/>
+          </a:schemeClr>
+        </a:solidFill>
+        <a:gradFill rotWithShape="1">
+          <a:gsLst>
+            <a:gs pos="0">
+              <a:schemeClr val="phClr">
+                <a:tint val="93000"/>
+                <a:satMod val="150000"/>
+                <a:shade val="98000"/>
+                <a:lumMod val="102000"/>
+              </a:schemeClr>
+            </a:gs>
+            <a:gs pos="50000">
+              <a:schemeClr val="phClr">
+                <a:tint val="98000"/>
+                <a:satMod val="130000"/>
+                <a:shade val="90000"/>
+                <a:lumMod val="103000"/>
+              </a:schemeClr>
+            </a:gs>
+            <a:gs pos="100000">
+              <a:schemeClr val="phClr">
+                <a:shade val="63000"/>
+                <a:satMod val="120000"/>
+              </a:schemeClr>
+            </a:gs>
+          </a:gsLst>
+          <a:lin ang="5400000" scaled="0"/>
+        </a:gradFill>
+      </a:bgFillStyleLst>
+    </a:fmtScheme>
+  </a:themeElements>
+  <a:objectDefaults/>
+  <a:extraClrSchemeLst/>
+  <a:extLst>
+    <a:ext uri="{05A4C25C-085E-4340-85A3-A5531E510DB2}">
+      <thm15:themeFamily xmlns:thm15="http://schemas.microsoft.com/office/thememl/2012/main" name="Office Theme" id="{62F939B6-93AF-4DB8-9C6B-D6C7DFDC589F}" vid="{4A3C46E8-61CC-4603-A589-7422A47A8E4A}"/>
+    </a:ext>
+  </a:extLst>
+</a:theme>
 </file>
</xml_diff>